<commit_message>
Senior Design paper - David's Edits.
</commit_message>
<xml_diff>
--- a/Documents/DatabaseDocuments/Database Flowchart.pptx
+++ b/Documents/DatabaseDocuments/Database Flowchart.pptx
@@ -6,6 +6,7 @@
   </p:sldMasterIdLst>
   <p:sldIdLst>
     <p:sldId id="256" r:id="rId2"/>
+    <p:sldId id="257" r:id="rId3"/>
   </p:sldIdLst>
   <p:sldSz cx="12192000" cy="6858000"/>
   <p:notesSz cx="6858000" cy="9144000"/>
@@ -104,6 +105,11 @@
       </a:defRPr>
     </a:lvl9pPr>
   </p:defaultTextStyle>
+  <p:extLst>
+    <p:ext uri="{EFAFB233-063F-42B5-8137-9DF3F51BA10A}">
+      <p15:sldGuideLst xmlns:p15="http://schemas.microsoft.com/office/powerpoint/2012/main"/>
+    </p:ext>
+  </p:extLst>
 </p:presentation>
 </file>
 
@@ -238,7 +244,7 @@
           <a:p>
             <a:fld id="{6E8D7449-F1A6-4B47-9BE4-41B6B7CB70BE}" type="datetimeFigureOut">
               <a:rPr lang="en-US" smtClean="0"/>
-              <a:t>10/17/2014</a:t>
+              <a:t>12/11/2014</a:t>
             </a:fld>
             <a:endParaRPr lang="en-US"/>
           </a:p>
@@ -408,7 +414,7 @@
           <a:p>
             <a:fld id="{6E8D7449-F1A6-4B47-9BE4-41B6B7CB70BE}" type="datetimeFigureOut">
               <a:rPr lang="en-US" smtClean="0"/>
-              <a:t>10/17/2014</a:t>
+              <a:t>12/11/2014</a:t>
             </a:fld>
             <a:endParaRPr lang="en-US"/>
           </a:p>
@@ -588,7 +594,7 @@
           <a:p>
             <a:fld id="{6E8D7449-F1A6-4B47-9BE4-41B6B7CB70BE}" type="datetimeFigureOut">
               <a:rPr lang="en-US" smtClean="0"/>
-              <a:t>10/17/2014</a:t>
+              <a:t>12/11/2014</a:t>
             </a:fld>
             <a:endParaRPr lang="en-US"/>
           </a:p>
@@ -758,7 +764,7 @@
           <a:p>
             <a:fld id="{6E8D7449-F1A6-4B47-9BE4-41B6B7CB70BE}" type="datetimeFigureOut">
               <a:rPr lang="en-US" smtClean="0"/>
-              <a:t>10/17/2014</a:t>
+              <a:t>12/11/2014</a:t>
             </a:fld>
             <a:endParaRPr lang="en-US"/>
           </a:p>
@@ -1004,7 +1010,7 @@
           <a:p>
             <a:fld id="{6E8D7449-F1A6-4B47-9BE4-41B6B7CB70BE}" type="datetimeFigureOut">
               <a:rPr lang="en-US" smtClean="0"/>
-              <a:t>10/17/2014</a:t>
+              <a:t>12/11/2014</a:t>
             </a:fld>
             <a:endParaRPr lang="en-US"/>
           </a:p>
@@ -1236,7 +1242,7 @@
           <a:p>
             <a:fld id="{6E8D7449-F1A6-4B47-9BE4-41B6B7CB70BE}" type="datetimeFigureOut">
               <a:rPr lang="en-US" smtClean="0"/>
-              <a:t>10/17/2014</a:t>
+              <a:t>12/11/2014</a:t>
             </a:fld>
             <a:endParaRPr lang="en-US"/>
           </a:p>
@@ -1603,7 +1609,7 @@
           <a:p>
             <a:fld id="{6E8D7449-F1A6-4B47-9BE4-41B6B7CB70BE}" type="datetimeFigureOut">
               <a:rPr lang="en-US" smtClean="0"/>
-              <a:t>10/17/2014</a:t>
+              <a:t>12/11/2014</a:t>
             </a:fld>
             <a:endParaRPr lang="en-US"/>
           </a:p>
@@ -1721,7 +1727,7 @@
           <a:p>
             <a:fld id="{6E8D7449-F1A6-4B47-9BE4-41B6B7CB70BE}" type="datetimeFigureOut">
               <a:rPr lang="en-US" smtClean="0"/>
-              <a:t>10/17/2014</a:t>
+              <a:t>12/11/2014</a:t>
             </a:fld>
             <a:endParaRPr lang="en-US"/>
           </a:p>
@@ -1816,7 +1822,7 @@
           <a:p>
             <a:fld id="{6E8D7449-F1A6-4B47-9BE4-41B6B7CB70BE}" type="datetimeFigureOut">
               <a:rPr lang="en-US" smtClean="0"/>
-              <a:t>10/17/2014</a:t>
+              <a:t>12/11/2014</a:t>
             </a:fld>
             <a:endParaRPr lang="en-US"/>
           </a:p>
@@ -2093,7 +2099,7 @@
           <a:p>
             <a:fld id="{6E8D7449-F1A6-4B47-9BE4-41B6B7CB70BE}" type="datetimeFigureOut">
               <a:rPr lang="en-US" smtClean="0"/>
-              <a:t>10/17/2014</a:t>
+              <a:t>12/11/2014</a:t>
             </a:fld>
             <a:endParaRPr lang="en-US"/>
           </a:p>
@@ -2346,7 +2352,7 @@
           <a:p>
             <a:fld id="{6E8D7449-F1A6-4B47-9BE4-41B6B7CB70BE}" type="datetimeFigureOut">
               <a:rPr lang="en-US" smtClean="0"/>
-              <a:t>10/17/2014</a:t>
+              <a:t>12/11/2014</a:t>
             </a:fld>
             <a:endParaRPr lang="en-US"/>
           </a:p>
@@ -2559,7 +2565,7 @@
           <a:p>
             <a:fld id="{6E8D7449-F1A6-4B47-9BE4-41B6B7CB70BE}" type="datetimeFigureOut">
               <a:rPr lang="en-US" smtClean="0"/>
-              <a:t>10/17/2014</a:t>
+              <a:t>12/11/2014</a:t>
             </a:fld>
             <a:endParaRPr lang="en-US"/>
           </a:p>
@@ -2972,7 +2978,7 @@
         </p:nvSpPr>
         <p:spPr>
           <a:xfrm>
-            <a:off x="4488871" y="800100"/>
+            <a:off x="4031673" y="2801033"/>
             <a:ext cx="1548247" cy="738664"/>
           </a:xfrm>
           <a:prstGeom prst="rect">
@@ -3029,7 +3035,7 @@
         </p:nvSpPr>
         <p:spPr>
           <a:xfrm>
-            <a:off x="7010399" y="800100"/>
+            <a:off x="6729065" y="525655"/>
             <a:ext cx="2133601" cy="1477328"/>
           </a:xfrm>
           <a:prstGeom prst="rect">
@@ -3059,22 +3065,30 @@
             <a:pPr algn="ctr"/>
             <a:r>
               <a:rPr lang="en-US" sz="1200" dirty="0" err="1" smtClean="0"/>
+              <a:t>Cal_Event_ID</a:t>
+            </a:r>
+            <a:r>
+              <a:rPr lang="en-US" sz="1200" dirty="0" smtClean="0"/>
+              <a:t> </a:t>
+            </a:r>
+            <a:r>
+              <a:rPr lang="en-US" sz="1200" dirty="0" smtClean="0"/>
+              <a:t>(Primary Key</a:t>
+            </a:r>
+            <a:r>
+              <a:rPr lang="en-US" sz="1200" dirty="0" smtClean="0"/>
+              <a:t>)</a:t>
+            </a:r>
+          </a:p>
+          <a:p>
+            <a:pPr algn="ctr"/>
+            <a:r>
+              <a:rPr lang="en-US" sz="1200" dirty="0" err="1"/>
               <a:t>Cal_ID</a:t>
             </a:r>
             <a:r>
-              <a:rPr lang="en-US" sz="1200" dirty="0" smtClean="0"/>
+              <a:rPr lang="en-US" sz="1200" dirty="0"/>
               <a:t> (Foreign Key)</a:t>
-            </a:r>
-          </a:p>
-          <a:p>
-            <a:pPr algn="ctr"/>
-            <a:r>
-              <a:rPr lang="en-US" sz="1200" dirty="0" err="1" smtClean="0"/>
-              <a:t>Cal_Event_ID</a:t>
-            </a:r>
-            <a:r>
-              <a:rPr lang="en-US" sz="1200" dirty="0" smtClean="0"/>
-              <a:t> (Primary Key)</a:t>
             </a:r>
           </a:p>
           <a:p>
@@ -3119,7 +3133,7 @@
         </p:nvSpPr>
         <p:spPr>
           <a:xfrm>
-            <a:off x="959427" y="2483482"/>
+            <a:off x="466752" y="4535872"/>
             <a:ext cx="2060865" cy="1877437"/>
           </a:xfrm>
           <a:prstGeom prst="rect">
@@ -3213,7 +3227,7 @@
         </p:nvSpPr>
         <p:spPr>
           <a:xfrm>
-            <a:off x="7010398" y="3718024"/>
+            <a:off x="351558" y="338435"/>
             <a:ext cx="2133601" cy="1661993"/>
           </a:xfrm>
           <a:prstGeom prst="rect">
@@ -3299,7 +3313,7 @@
         </p:nvSpPr>
         <p:spPr>
           <a:xfrm>
-            <a:off x="4100944" y="4148911"/>
+            <a:off x="3531176" y="5167513"/>
             <a:ext cx="2060865" cy="1231106"/>
           </a:xfrm>
           <a:prstGeom prst="rect">
@@ -3372,7 +3386,7 @@
         </p:nvSpPr>
         <p:spPr>
           <a:xfrm>
-            <a:off x="3868882" y="2272173"/>
+            <a:off x="424294" y="2672282"/>
             <a:ext cx="2060865" cy="800219"/>
           </a:xfrm>
           <a:prstGeom prst="rect">
@@ -3401,24 +3415,33 @@
           <a:p>
             <a:pPr algn="ctr"/>
             <a:r>
+              <a:rPr lang="en-US" sz="1400" dirty="0" err="1"/>
+              <a:t>User_ID</a:t>
+            </a:r>
+            <a:r>
+              <a:rPr lang="en-US" sz="1400" dirty="0"/>
+              <a:t>(Foreign Key)</a:t>
+            </a:r>
+          </a:p>
+          <a:p>
+            <a:pPr algn="ctr"/>
+            <a:r>
               <a:rPr lang="en-US" sz="1400" dirty="0" err="1" smtClean="0"/>
               <a:t>Group_ID</a:t>
             </a:r>
             <a:r>
               <a:rPr lang="en-US" sz="1400" dirty="0" smtClean="0"/>
-              <a:t> (Foreign Key)</a:t>
-            </a:r>
-          </a:p>
-          <a:p>
-            <a:pPr algn="ctr"/>
-            <a:r>
-              <a:rPr lang="en-US" sz="1400" dirty="0" err="1" smtClean="0"/>
-              <a:t>User_ID</a:t>
+              <a:t> </a:t>
             </a:r>
             <a:r>
               <a:rPr lang="en-US" sz="1400" dirty="0" smtClean="0"/>
-              <a:t>(Foreign Key)</a:t>
-            </a:r>
+              <a:t>(Foreign Key</a:t>
+            </a:r>
+            <a:r>
+              <a:rPr lang="en-US" sz="1400" dirty="0" smtClean="0"/>
+              <a:t>)</a:t>
+            </a:r>
+            <a:endParaRPr lang="en-US" sz="1400" dirty="0" smtClean="0"/>
           </a:p>
         </p:txBody>
       </p:sp>
@@ -3430,7 +3453,7 @@
         </p:nvSpPr>
         <p:spPr>
           <a:xfrm>
-            <a:off x="7010399" y="2486918"/>
+            <a:off x="3637935" y="525655"/>
             <a:ext cx="2133601" cy="1015663"/>
           </a:xfrm>
           <a:prstGeom prst="rect">
@@ -3495,50 +3518,12 @@
           <p:nvPr/>
         </p:nvCxnSpPr>
         <p:spPr>
-          <a:xfrm flipV="1">
-            <a:off x="2826327" y="2672282"/>
-            <a:ext cx="1194955" cy="237173"/>
+          <a:xfrm>
+            <a:off x="2435798" y="4977323"/>
+            <a:ext cx="1202137" cy="631246"/>
           </a:xfrm>
           <a:prstGeom prst="bentConnector3">
             <a:avLst/>
-          </a:prstGeom>
-          <a:ln>
-            <a:solidFill>
-              <a:schemeClr val="tx1"/>
-            </a:solidFill>
-            <a:tailEnd type="triangle"/>
-          </a:ln>
-        </p:spPr>
-        <p:style>
-          <a:lnRef idx="1">
-            <a:schemeClr val="accent1"/>
-          </a:lnRef>
-          <a:fillRef idx="0">
-            <a:schemeClr val="accent1"/>
-          </a:fillRef>
-          <a:effectRef idx="0">
-            <a:schemeClr val="accent1"/>
-          </a:effectRef>
-          <a:fontRef idx="minor">
-            <a:schemeClr val="tx1"/>
-          </a:fontRef>
-        </p:style>
-      </p:cxnSp>
-      <p:cxnSp>
-        <p:nvCxnSpPr>
-          <p:cNvPr id="16" name="Elbow Connector 15"/>
-          <p:cNvCxnSpPr/>
-          <p:nvPr/>
-        </p:nvCxnSpPr>
-        <p:spPr>
-          <a:xfrm rot="10800000">
-            <a:off x="5795529" y="2930483"/>
-            <a:ext cx="1415762" cy="1218429"/>
-          </a:xfrm>
-          <a:prstGeom prst="bentConnector3">
-            <a:avLst>
-              <a:gd name="adj1" fmla="val 50000"/>
-            </a:avLst>
           </a:prstGeom>
           <a:ln>
             <a:solidFill>
@@ -3570,7 +3555,7 @@
         </p:nvCxnSpPr>
         <p:spPr>
           <a:xfrm>
-            <a:off x="9019309" y="4148911"/>
+            <a:off x="5607516" y="3228934"/>
             <a:ext cx="789709" cy="0"/>
           </a:xfrm>
           <a:prstGeom prst="line">
@@ -3605,8 +3590,8 @@
         </p:nvCxnSpPr>
         <p:spPr>
           <a:xfrm flipV="1">
-            <a:off x="9819409" y="3169227"/>
-            <a:ext cx="0" cy="979684"/>
+            <a:off x="6407616" y="1169431"/>
+            <a:ext cx="0" cy="2059505"/>
           </a:xfrm>
           <a:prstGeom prst="line">
             <a:avLst/>
@@ -3640,8 +3625,8 @@
         </p:nvCxnSpPr>
         <p:spPr>
           <a:xfrm flipH="1" flipV="1">
-            <a:off x="8905009" y="3158836"/>
-            <a:ext cx="904009" cy="10391"/>
+            <a:off x="5771536" y="940667"/>
+            <a:ext cx="1011105" cy="11623"/>
           </a:xfrm>
           <a:prstGeom prst="straightConnector1">
             <a:avLst/>
@@ -3676,7 +3661,7 @@
         </p:nvCxnSpPr>
         <p:spPr>
           <a:xfrm>
-            <a:off x="9029700" y="1400734"/>
+            <a:off x="2301418" y="741972"/>
             <a:ext cx="789709" cy="0"/>
           </a:xfrm>
           <a:prstGeom prst="line">
@@ -3711,8 +3696,8 @@
         </p:nvCxnSpPr>
         <p:spPr>
           <a:xfrm flipV="1">
-            <a:off x="9819409" y="1400734"/>
-            <a:ext cx="0" cy="1529749"/>
+            <a:off x="3057984" y="741973"/>
+            <a:ext cx="629" cy="2330418"/>
           </a:xfrm>
           <a:prstGeom prst="line">
             <a:avLst/>
@@ -3746,8 +3731,8 @@
         </p:nvCxnSpPr>
         <p:spPr>
           <a:xfrm flipH="1" flipV="1">
-            <a:off x="9143999" y="2896833"/>
-            <a:ext cx="665019" cy="7645"/>
+            <a:off x="2360284" y="3059977"/>
+            <a:ext cx="708720" cy="12414"/>
           </a:xfrm>
           <a:prstGeom prst="straightConnector1">
             <a:avLst/>
@@ -3782,8 +3767,8 @@
         </p:nvCxnSpPr>
         <p:spPr>
           <a:xfrm>
-            <a:off x="5933209" y="1169432"/>
-            <a:ext cx="1423555" cy="0"/>
+            <a:off x="6407616" y="1158993"/>
+            <a:ext cx="655745" cy="0"/>
           </a:xfrm>
           <a:prstGeom prst="straightConnector1">
             <a:avLst/>
@@ -3818,43 +3803,8 @@
         </p:nvCxnSpPr>
         <p:spPr>
           <a:xfrm>
-            <a:off x="2826327" y="2914590"/>
+            <a:off x="2437506" y="4969532"/>
             <a:ext cx="597477" cy="0"/>
-          </a:xfrm>
-          <a:prstGeom prst="line">
-            <a:avLst/>
-          </a:prstGeom>
-          <a:ln>
-            <a:solidFill>
-              <a:schemeClr val="tx1"/>
-            </a:solidFill>
-          </a:ln>
-        </p:spPr>
-        <p:style>
-          <a:lnRef idx="1">
-            <a:schemeClr val="accent1"/>
-          </a:lnRef>
-          <a:fillRef idx="0">
-            <a:schemeClr val="accent1"/>
-          </a:fillRef>
-          <a:effectRef idx="0">
-            <a:schemeClr val="accent1"/>
-          </a:effectRef>
-          <a:fontRef idx="minor">
-            <a:schemeClr val="tx1"/>
-          </a:fontRef>
-        </p:style>
-      </p:cxnSp>
-      <p:cxnSp>
-        <p:nvCxnSpPr>
-          <p:cNvPr id="46" name="Straight Connector 45"/>
-          <p:cNvCxnSpPr/>
-          <p:nvPr/>
-        </p:nvCxnSpPr>
-        <p:spPr>
-          <a:xfrm flipV="1">
-            <a:off x="3423804" y="2894195"/>
-            <a:ext cx="0" cy="1654825"/>
           </a:xfrm>
           <a:prstGeom prst="line">
             <a:avLst/>
@@ -3888,8 +3838,8 @@
         </p:nvCxnSpPr>
         <p:spPr>
           <a:xfrm flipV="1">
-            <a:off x="3435925" y="4549021"/>
-            <a:ext cx="836469" cy="1"/>
+            <a:off x="3044210" y="3417442"/>
+            <a:ext cx="1128772" cy="1"/>
           </a:xfrm>
           <a:prstGeom prst="straightConnector1">
             <a:avLst/>
@@ -3918,25 +3868,58 @@
       </p:cxnSp>
       <p:cxnSp>
         <p:nvCxnSpPr>
-          <p:cNvPr id="52" name="Elbow Connector 51"/>
+          <p:cNvPr id="26" name="Straight Arrow Connector 25"/>
           <p:cNvCxnSpPr/>
           <p:nvPr/>
         </p:nvCxnSpPr>
         <p:spPr>
-          <a:xfrm flipV="1">
-            <a:off x="2822864" y="1431672"/>
-            <a:ext cx="1738745" cy="1472808"/>
-          </a:xfrm>
-          <a:prstGeom prst="bentConnector3">
-            <a:avLst>
-              <a:gd name="adj1" fmla="val 34462"/>
-            </a:avLst>
+          <a:xfrm flipH="1" flipV="1">
+            <a:off x="2395294" y="3337683"/>
+            <a:ext cx="665019" cy="7645"/>
+          </a:xfrm>
+          <a:prstGeom prst="straightConnector1">
+            <a:avLst/>
           </a:prstGeom>
           <a:ln>
             <a:solidFill>
               <a:schemeClr val="tx1"/>
             </a:solidFill>
             <a:tailEnd type="triangle"/>
+          </a:ln>
+        </p:spPr>
+        <p:style>
+          <a:lnRef idx="1">
+            <a:schemeClr val="accent1"/>
+          </a:lnRef>
+          <a:fillRef idx="0">
+            <a:schemeClr val="accent1"/>
+          </a:fillRef>
+          <a:effectRef idx="0">
+            <a:schemeClr val="accent1"/>
+          </a:effectRef>
+          <a:fontRef idx="minor">
+            <a:schemeClr val="tx1"/>
+          </a:fontRef>
+        </p:style>
+      </p:cxnSp>
+      <p:cxnSp>
+        <p:nvCxnSpPr>
+          <p:cNvPr id="28" name="Straight Connector 27"/>
+          <p:cNvCxnSpPr/>
+          <p:nvPr/>
+        </p:nvCxnSpPr>
+        <p:spPr>
+          <a:xfrm flipV="1">
+            <a:off x="3025302" y="3297149"/>
+            <a:ext cx="8603" cy="1672383"/>
+          </a:xfrm>
+          <a:prstGeom prst="line">
+            <a:avLst/>
+          </a:prstGeom>
+          <a:ln>
+            <a:solidFill>
+              <a:schemeClr val="tx1"/>
+            </a:solidFill>
           </a:ln>
         </p:spPr>
         <p:style>
@@ -3958,6 +3941,1139 @@
     <p:extLst>
       <p:ext uri="{BB962C8B-B14F-4D97-AF65-F5344CB8AC3E}">
         <p14:creationId xmlns:p14="http://schemas.microsoft.com/office/powerpoint/2010/main" val="3904276837"/>
+      </p:ext>
+    </p:extLst>
+  </p:cSld>
+  <p:clrMapOvr>
+    <a:masterClrMapping/>
+  </p:clrMapOvr>
+</p:sld>
+</file>
+
+<file path=ppt/slides/slide2.xml><?xml version="1.0" encoding="utf-8"?>
+<p:sld xmlns:a="http://schemas.openxmlformats.org/drawingml/2006/main" xmlns:r="http://schemas.openxmlformats.org/officeDocument/2006/relationships" xmlns:p="http://schemas.openxmlformats.org/presentationml/2006/main">
+  <p:cSld>
+    <p:spTree>
+      <p:nvGrpSpPr>
+        <p:cNvPr id="1" name=""/>
+        <p:cNvGrpSpPr/>
+        <p:nvPr/>
+      </p:nvGrpSpPr>
+      <p:grpSpPr>
+        <a:xfrm>
+          <a:off x="0" y="0"/>
+          <a:ext cx="0" cy="0"/>
+          <a:chOff x="0" y="0"/>
+          <a:chExt cx="0" cy="0"/>
+        </a:xfrm>
+      </p:grpSpPr>
+      <p:sp>
+        <p:nvSpPr>
+          <p:cNvPr id="4" name="TextBox 3"/>
+          <p:cNvSpPr txBox="1"/>
+          <p:nvPr/>
+        </p:nvSpPr>
+        <p:spPr>
+          <a:xfrm>
+            <a:off x="8082118" y="326197"/>
+            <a:ext cx="2615381" cy="1846659"/>
+          </a:xfrm>
+          <a:prstGeom prst="rect">
+            <a:avLst/>
+          </a:prstGeom>
+        </p:spPr>
+        <p:style>
+          <a:lnRef idx="1">
+            <a:schemeClr val="accent6"/>
+          </a:lnRef>
+          <a:fillRef idx="2">
+            <a:schemeClr val="accent6"/>
+          </a:fillRef>
+          <a:effectRef idx="1">
+            <a:schemeClr val="accent6"/>
+          </a:effectRef>
+          <a:fontRef idx="minor">
+            <a:schemeClr val="dk1"/>
+          </a:fontRef>
+        </p:style>
+        <p:txBody>
+          <a:bodyPr wrap="square" rtlCol="0">
+            <a:spAutoFit/>
+          </a:bodyPr>
+          <a:lstStyle/>
+          <a:p>
+            <a:pPr algn="ctr"/>
+            <a:r>
+              <a:rPr lang="en-US" b="1" u="sng" dirty="0" smtClean="0"/>
+              <a:t>Users</a:t>
+            </a:r>
+          </a:p>
+          <a:p>
+            <a:pPr algn="ctr"/>
+            <a:r>
+              <a:rPr lang="en-US" sz="1600" dirty="0" smtClean="0"/>
+              <a:t>User ID (Primary Key)</a:t>
+            </a:r>
+          </a:p>
+          <a:p>
+            <a:pPr algn="ctr"/>
+            <a:r>
+              <a:rPr lang="en-US" sz="1600" dirty="0" err="1"/>
+              <a:t>User_Name</a:t>
+            </a:r>
+            <a:endParaRPr lang="en-US" sz="1600" dirty="0"/>
+          </a:p>
+          <a:p>
+            <a:pPr algn="ctr"/>
+            <a:r>
+              <a:rPr lang="en-US" sz="1600" dirty="0" err="1"/>
+              <a:t>User_Email</a:t>
+            </a:r>
+            <a:endParaRPr lang="en-US" sz="1600" dirty="0"/>
+          </a:p>
+          <a:p>
+            <a:pPr algn="ctr"/>
+            <a:r>
+              <a:rPr lang="en-US" sz="1600" dirty="0" err="1"/>
+              <a:t>User_Password</a:t>
+            </a:r>
+            <a:endParaRPr lang="en-US" sz="1600" dirty="0"/>
+          </a:p>
+          <a:p>
+            <a:pPr algn="ctr"/>
+            <a:r>
+              <a:rPr lang="en-US" sz="1600" dirty="0" err="1"/>
+              <a:t>User_Bio</a:t>
+            </a:r>
+            <a:endParaRPr lang="en-US" sz="1600" dirty="0"/>
+          </a:p>
+          <a:p>
+            <a:pPr algn="ctr"/>
+            <a:r>
+              <a:rPr lang="en-US" sz="1600" dirty="0" err="1" smtClean="0"/>
+              <a:t>Last_Updated</a:t>
+            </a:r>
+            <a:endParaRPr lang="en-US" sz="1600" dirty="0"/>
+          </a:p>
+        </p:txBody>
+      </p:sp>
+      <p:sp>
+        <p:nvSpPr>
+          <p:cNvPr id="5" name="TextBox 4"/>
+          <p:cNvSpPr txBox="1"/>
+          <p:nvPr/>
+        </p:nvSpPr>
+        <p:spPr>
+          <a:xfrm>
+            <a:off x="4670322" y="326197"/>
+            <a:ext cx="2615381" cy="861774"/>
+          </a:xfrm>
+          <a:prstGeom prst="rect">
+            <a:avLst/>
+          </a:prstGeom>
+        </p:spPr>
+        <p:style>
+          <a:lnRef idx="1">
+            <a:schemeClr val="accent6"/>
+          </a:lnRef>
+          <a:fillRef idx="2">
+            <a:schemeClr val="accent6"/>
+          </a:fillRef>
+          <a:effectRef idx="1">
+            <a:schemeClr val="accent6"/>
+          </a:effectRef>
+          <a:fontRef idx="minor">
+            <a:schemeClr val="dk1"/>
+          </a:fontRef>
+        </p:style>
+        <p:txBody>
+          <a:bodyPr wrap="square" rtlCol="0">
+            <a:spAutoFit/>
+          </a:bodyPr>
+          <a:lstStyle/>
+          <a:p>
+            <a:pPr algn="ctr"/>
+            <a:r>
+              <a:rPr lang="en-US" b="1" u="sng" dirty="0" err="1"/>
+              <a:t>Group_Members</a:t>
+            </a:r>
+            <a:endParaRPr lang="en-US" b="1" u="sng" dirty="0"/>
+          </a:p>
+          <a:p>
+            <a:pPr algn="ctr"/>
+            <a:r>
+              <a:rPr lang="en-US" sz="1600" dirty="0" err="1"/>
+              <a:t>User_ID</a:t>
+            </a:r>
+            <a:r>
+              <a:rPr lang="en-US" sz="1600" dirty="0"/>
+              <a:t>(Foreign Key)</a:t>
+            </a:r>
+          </a:p>
+          <a:p>
+            <a:pPr algn="ctr"/>
+            <a:r>
+              <a:rPr lang="en-US" sz="1600" dirty="0" err="1"/>
+              <a:t>Group_ID</a:t>
+            </a:r>
+            <a:r>
+              <a:rPr lang="en-US" sz="1600" dirty="0"/>
+              <a:t> (Foreign Key)</a:t>
+            </a:r>
+          </a:p>
+        </p:txBody>
+      </p:sp>
+      <p:cxnSp>
+        <p:nvCxnSpPr>
+          <p:cNvPr id="7" name="Straight Arrow Connector 6"/>
+          <p:cNvCxnSpPr/>
+          <p:nvPr/>
+        </p:nvCxnSpPr>
+        <p:spPr>
+          <a:xfrm>
+            <a:off x="4208206" y="1002890"/>
+            <a:ext cx="678426" cy="0"/>
+          </a:xfrm>
+          <a:prstGeom prst="straightConnector1">
+            <a:avLst/>
+          </a:prstGeom>
+          <a:ln>
+            <a:tailEnd type="triangle"/>
+          </a:ln>
+        </p:spPr>
+        <p:style>
+          <a:lnRef idx="3">
+            <a:schemeClr val="dk1"/>
+          </a:lnRef>
+          <a:fillRef idx="0">
+            <a:schemeClr val="dk1"/>
+          </a:fillRef>
+          <a:effectRef idx="2">
+            <a:schemeClr val="dk1"/>
+          </a:effectRef>
+          <a:fontRef idx="minor">
+            <a:schemeClr val="tx1"/>
+          </a:fontRef>
+        </p:style>
+      </p:cxnSp>
+      <p:sp>
+        <p:nvSpPr>
+          <p:cNvPr id="8" name="TextBox 7"/>
+          <p:cNvSpPr txBox="1"/>
+          <p:nvPr/>
+        </p:nvSpPr>
+        <p:spPr>
+          <a:xfrm>
+            <a:off x="1401096" y="1487616"/>
+            <a:ext cx="2615381" cy="2092881"/>
+          </a:xfrm>
+          <a:prstGeom prst="rect">
+            <a:avLst/>
+          </a:prstGeom>
+        </p:spPr>
+        <p:style>
+          <a:lnRef idx="1">
+            <a:schemeClr val="accent6"/>
+          </a:lnRef>
+          <a:fillRef idx="2">
+            <a:schemeClr val="accent6"/>
+          </a:fillRef>
+          <a:effectRef idx="1">
+            <a:schemeClr val="accent6"/>
+          </a:effectRef>
+          <a:fontRef idx="minor">
+            <a:schemeClr val="dk1"/>
+          </a:fontRef>
+        </p:style>
+        <p:txBody>
+          <a:bodyPr wrap="square" rtlCol="0">
+            <a:spAutoFit/>
+          </a:bodyPr>
+          <a:lstStyle/>
+          <a:p>
+            <a:pPr algn="ctr"/>
+            <a:r>
+              <a:rPr lang="en-US" b="1" u="sng" dirty="0"/>
+              <a:t>Groups</a:t>
+            </a:r>
+          </a:p>
+          <a:p>
+            <a:pPr algn="ctr"/>
+            <a:r>
+              <a:rPr lang="en-US" sz="1600" dirty="0" err="1"/>
+              <a:t>Grp_ID</a:t>
+            </a:r>
+            <a:r>
+              <a:rPr lang="en-US" sz="1600" dirty="0"/>
+              <a:t> (Primary Key)</a:t>
+            </a:r>
+          </a:p>
+          <a:p>
+            <a:pPr algn="ctr"/>
+            <a:r>
+              <a:rPr lang="en-US" sz="1600" dirty="0" err="1"/>
+              <a:t>Grp_Name</a:t>
+            </a:r>
+            <a:endParaRPr lang="en-US" sz="1600" dirty="0"/>
+          </a:p>
+          <a:p>
+            <a:pPr algn="ctr"/>
+            <a:r>
+              <a:rPr lang="en-US" sz="1600" dirty="0" err="1"/>
+              <a:t>Grp_Creator</a:t>
+            </a:r>
+            <a:endParaRPr lang="en-US" sz="1600" dirty="0"/>
+          </a:p>
+          <a:p>
+            <a:pPr algn="ctr"/>
+            <a:r>
+              <a:rPr lang="en-US" sz="1600" dirty="0" err="1"/>
+              <a:t>Grp_Description</a:t>
+            </a:r>
+            <a:endParaRPr lang="en-US" sz="1600" dirty="0"/>
+          </a:p>
+          <a:p>
+            <a:pPr algn="ctr"/>
+            <a:r>
+              <a:rPr lang="en-US" sz="1600" dirty="0" err="1"/>
+              <a:t>Grp_Password</a:t>
+            </a:r>
+            <a:endParaRPr lang="en-US" sz="1600" dirty="0"/>
+          </a:p>
+          <a:p>
+            <a:pPr algn="ctr"/>
+            <a:r>
+              <a:rPr lang="en-US" sz="1600" dirty="0" err="1"/>
+              <a:t>GooDrive_UserName</a:t>
+            </a:r>
+            <a:endParaRPr lang="en-US" sz="1600" dirty="0"/>
+          </a:p>
+          <a:p>
+            <a:pPr algn="ctr"/>
+            <a:r>
+              <a:rPr lang="en-US" sz="1600" dirty="0" err="1"/>
+              <a:t>GooDrive_Password</a:t>
+            </a:r>
+            <a:endParaRPr lang="en-US" sz="1600" dirty="0"/>
+          </a:p>
+        </p:txBody>
+      </p:sp>
+      <p:cxnSp>
+        <p:nvCxnSpPr>
+          <p:cNvPr id="15" name="Straight Connector 14"/>
+          <p:cNvCxnSpPr/>
+          <p:nvPr/>
+        </p:nvCxnSpPr>
+        <p:spPr>
+          <a:xfrm>
+            <a:off x="4245075" y="2534056"/>
+            <a:ext cx="0" cy="1369595"/>
+          </a:xfrm>
+          <a:prstGeom prst="line">
+            <a:avLst/>
+          </a:prstGeom>
+        </p:spPr>
+        <p:style>
+          <a:lnRef idx="3">
+            <a:schemeClr val="dk1"/>
+          </a:lnRef>
+          <a:fillRef idx="0">
+            <a:schemeClr val="dk1"/>
+          </a:fillRef>
+          <a:effectRef idx="2">
+            <a:schemeClr val="dk1"/>
+          </a:effectRef>
+          <a:fontRef idx="minor">
+            <a:schemeClr val="tx1"/>
+          </a:fontRef>
+        </p:style>
+      </p:cxnSp>
+      <p:sp>
+        <p:nvSpPr>
+          <p:cNvPr id="23" name="TextBox 22"/>
+          <p:cNvSpPr txBox="1"/>
+          <p:nvPr/>
+        </p:nvSpPr>
+        <p:spPr>
+          <a:xfrm>
+            <a:off x="1401097" y="3942735"/>
+            <a:ext cx="2615381" cy="1354217"/>
+          </a:xfrm>
+          <a:prstGeom prst="rect">
+            <a:avLst/>
+          </a:prstGeom>
+        </p:spPr>
+        <p:style>
+          <a:lnRef idx="1">
+            <a:schemeClr val="accent4"/>
+          </a:lnRef>
+          <a:fillRef idx="2">
+            <a:schemeClr val="accent4"/>
+          </a:fillRef>
+          <a:effectRef idx="1">
+            <a:schemeClr val="accent4"/>
+          </a:effectRef>
+          <a:fontRef idx="minor">
+            <a:schemeClr val="dk1"/>
+          </a:fontRef>
+        </p:style>
+        <p:txBody>
+          <a:bodyPr wrap="square" rtlCol="0">
+            <a:spAutoFit/>
+          </a:bodyPr>
+          <a:lstStyle/>
+          <a:p>
+            <a:pPr algn="ctr"/>
+            <a:r>
+              <a:rPr lang="en-US" b="1" u="sng" dirty="0"/>
+              <a:t>Messages</a:t>
+            </a:r>
+          </a:p>
+          <a:p>
+            <a:pPr algn="ctr"/>
+            <a:r>
+              <a:rPr lang="en-US" sz="1600" dirty="0" err="1"/>
+              <a:t>Grp_ID</a:t>
+            </a:r>
+            <a:r>
+              <a:rPr lang="en-US" sz="1600" dirty="0"/>
+              <a:t> (Foreign Key)</a:t>
+            </a:r>
+          </a:p>
+          <a:p>
+            <a:pPr algn="ctr"/>
+            <a:r>
+              <a:rPr lang="en-US" sz="1600" dirty="0" err="1"/>
+              <a:t>Mess_ID</a:t>
+            </a:r>
+            <a:r>
+              <a:rPr lang="en-US" sz="1600" dirty="0"/>
+              <a:t> (Primary Key)</a:t>
+            </a:r>
+          </a:p>
+          <a:p>
+            <a:pPr algn="ctr"/>
+            <a:r>
+              <a:rPr lang="en-US" sz="1600" dirty="0" err="1"/>
+              <a:t>Mess_Type</a:t>
+            </a:r>
+            <a:endParaRPr lang="en-US" sz="1600" dirty="0"/>
+          </a:p>
+          <a:p>
+            <a:pPr algn="ctr"/>
+            <a:r>
+              <a:rPr lang="en-US" sz="1600" dirty="0" err="1"/>
+              <a:t>Mess_Contents</a:t>
+            </a:r>
+            <a:endParaRPr lang="en-US" sz="1600" dirty="0"/>
+          </a:p>
+        </p:txBody>
+      </p:sp>
+      <p:sp>
+        <p:nvSpPr>
+          <p:cNvPr id="25" name="TextBox 24"/>
+          <p:cNvSpPr txBox="1"/>
+          <p:nvPr/>
+        </p:nvSpPr>
+        <p:spPr>
+          <a:xfrm>
+            <a:off x="4399935" y="1864664"/>
+            <a:ext cx="2615381" cy="861774"/>
+          </a:xfrm>
+          <a:prstGeom prst="rect">
+            <a:avLst/>
+          </a:prstGeom>
+        </p:spPr>
+        <p:style>
+          <a:lnRef idx="1">
+            <a:schemeClr val="accent6"/>
+          </a:lnRef>
+          <a:fillRef idx="2">
+            <a:schemeClr val="accent6"/>
+          </a:fillRef>
+          <a:effectRef idx="1">
+            <a:schemeClr val="accent6"/>
+          </a:effectRef>
+          <a:fontRef idx="minor">
+            <a:schemeClr val="dk1"/>
+          </a:fontRef>
+        </p:style>
+        <p:txBody>
+          <a:bodyPr wrap="square" rtlCol="0">
+            <a:spAutoFit/>
+          </a:bodyPr>
+          <a:lstStyle/>
+          <a:p>
+            <a:pPr algn="ctr"/>
+            <a:r>
+              <a:rPr lang="en-US" b="1" u="sng" dirty="0"/>
+              <a:t>Calendar</a:t>
+            </a:r>
+          </a:p>
+          <a:p>
+            <a:pPr algn="ctr"/>
+            <a:r>
+              <a:rPr lang="en-US" sz="1600" dirty="0" err="1" smtClean="0"/>
+              <a:t>Grp_ID</a:t>
+            </a:r>
+            <a:r>
+              <a:rPr lang="en-US" sz="1600" dirty="0" smtClean="0"/>
+              <a:t> </a:t>
+            </a:r>
+            <a:r>
+              <a:rPr lang="en-US" sz="1600" dirty="0"/>
+              <a:t>(Foreign Key</a:t>
+            </a:r>
+            <a:r>
+              <a:rPr lang="en-US" sz="1600" dirty="0" smtClean="0"/>
+              <a:t>)</a:t>
+            </a:r>
+            <a:r>
+              <a:rPr lang="en-US" sz="1600" dirty="0"/>
+              <a:t> </a:t>
+            </a:r>
+            <a:endParaRPr lang="en-US" sz="1600" dirty="0" smtClean="0"/>
+          </a:p>
+          <a:p>
+            <a:pPr algn="ctr"/>
+            <a:r>
+              <a:rPr lang="en-US" sz="1600" dirty="0" err="1" smtClean="0"/>
+              <a:t>Cal_ID</a:t>
+            </a:r>
+            <a:r>
+              <a:rPr lang="en-US" sz="1600" dirty="0" smtClean="0"/>
+              <a:t> </a:t>
+            </a:r>
+            <a:r>
+              <a:rPr lang="en-US" sz="1600" dirty="0"/>
+              <a:t>(Primary Key</a:t>
+            </a:r>
+            <a:r>
+              <a:rPr lang="en-US" sz="1600" dirty="0" smtClean="0"/>
+              <a:t>)</a:t>
+            </a:r>
+            <a:endParaRPr lang="en-US" sz="1600" dirty="0"/>
+          </a:p>
+        </p:txBody>
+      </p:sp>
+      <p:cxnSp>
+        <p:nvCxnSpPr>
+          <p:cNvPr id="26" name="Straight Connector 25"/>
+          <p:cNvCxnSpPr/>
+          <p:nvPr/>
+        </p:nvCxnSpPr>
+        <p:spPr>
+          <a:xfrm>
+            <a:off x="4208206" y="1913679"/>
+            <a:ext cx="0" cy="381872"/>
+          </a:xfrm>
+          <a:prstGeom prst="line">
+            <a:avLst/>
+          </a:prstGeom>
+        </p:spPr>
+        <p:style>
+          <a:lnRef idx="3">
+            <a:schemeClr val="dk1"/>
+          </a:lnRef>
+          <a:fillRef idx="0">
+            <a:schemeClr val="dk1"/>
+          </a:fillRef>
+          <a:effectRef idx="2">
+            <a:schemeClr val="dk1"/>
+          </a:effectRef>
+          <a:fontRef idx="minor">
+            <a:schemeClr val="tx1"/>
+          </a:fontRef>
+        </p:style>
+      </p:cxnSp>
+      <p:cxnSp>
+        <p:nvCxnSpPr>
+          <p:cNvPr id="28" name="Straight Arrow Connector 27"/>
+          <p:cNvCxnSpPr/>
+          <p:nvPr/>
+        </p:nvCxnSpPr>
+        <p:spPr>
+          <a:xfrm>
+            <a:off x="4193457" y="2295551"/>
+            <a:ext cx="594851" cy="0"/>
+          </a:xfrm>
+          <a:prstGeom prst="straightConnector1">
+            <a:avLst/>
+          </a:prstGeom>
+          <a:ln>
+            <a:tailEnd type="triangle"/>
+          </a:ln>
+        </p:spPr>
+        <p:style>
+          <a:lnRef idx="3">
+            <a:schemeClr val="dk1"/>
+          </a:lnRef>
+          <a:fillRef idx="0">
+            <a:schemeClr val="dk1"/>
+          </a:fillRef>
+          <a:effectRef idx="2">
+            <a:schemeClr val="dk1"/>
+          </a:effectRef>
+          <a:fontRef idx="minor">
+            <a:schemeClr val="tx1"/>
+          </a:fontRef>
+        </p:style>
+      </p:cxnSp>
+      <p:sp>
+        <p:nvSpPr>
+          <p:cNvPr id="32" name="TextBox 31"/>
+          <p:cNvSpPr txBox="1"/>
+          <p:nvPr/>
+        </p:nvSpPr>
+        <p:spPr>
+          <a:xfrm>
+            <a:off x="4399935" y="3223113"/>
+            <a:ext cx="2615381" cy="1846659"/>
+          </a:xfrm>
+          <a:prstGeom prst="rect">
+            <a:avLst/>
+          </a:prstGeom>
+        </p:spPr>
+        <p:style>
+          <a:lnRef idx="1">
+            <a:schemeClr val="accent6"/>
+          </a:lnRef>
+          <a:fillRef idx="2">
+            <a:schemeClr val="accent6"/>
+          </a:fillRef>
+          <a:effectRef idx="1">
+            <a:schemeClr val="accent6"/>
+          </a:effectRef>
+          <a:fontRef idx="minor">
+            <a:schemeClr val="dk1"/>
+          </a:fontRef>
+        </p:style>
+        <p:txBody>
+          <a:bodyPr wrap="square" rtlCol="0">
+            <a:spAutoFit/>
+          </a:bodyPr>
+          <a:lstStyle/>
+          <a:p>
+            <a:pPr algn="ctr"/>
+            <a:r>
+              <a:rPr lang="en-US" b="1" u="sng" dirty="0" err="1"/>
+              <a:t>Calendar_Event</a:t>
+            </a:r>
+            <a:endParaRPr lang="en-US" b="1" u="sng" dirty="0"/>
+          </a:p>
+          <a:p>
+            <a:pPr algn="ctr"/>
+            <a:r>
+              <a:rPr lang="en-US" sz="1600" dirty="0" err="1"/>
+              <a:t>Cal_Event_ID</a:t>
+            </a:r>
+            <a:r>
+              <a:rPr lang="en-US" sz="1600" dirty="0"/>
+              <a:t> (Primary Key)</a:t>
+            </a:r>
+          </a:p>
+          <a:p>
+            <a:pPr algn="ctr"/>
+            <a:r>
+              <a:rPr lang="en-US" sz="1600" dirty="0" err="1"/>
+              <a:t>Cal_ID</a:t>
+            </a:r>
+            <a:r>
+              <a:rPr lang="en-US" sz="1600" dirty="0"/>
+              <a:t> (Foreign Key)</a:t>
+            </a:r>
+          </a:p>
+          <a:p>
+            <a:pPr algn="ctr"/>
+            <a:r>
+              <a:rPr lang="en-US" sz="1600" dirty="0" err="1"/>
+              <a:t>Date_Time_Start</a:t>
+            </a:r>
+            <a:endParaRPr lang="en-US" sz="1600" dirty="0"/>
+          </a:p>
+          <a:p>
+            <a:pPr algn="ctr"/>
+            <a:r>
+              <a:rPr lang="en-US" sz="1600" dirty="0" err="1"/>
+              <a:t>Date_Time_End</a:t>
+            </a:r>
+            <a:endParaRPr lang="en-US" sz="1600" dirty="0"/>
+          </a:p>
+          <a:p>
+            <a:pPr algn="ctr"/>
+            <a:r>
+              <a:rPr lang="en-US" sz="1600" dirty="0" err="1"/>
+              <a:t>Cal_Entry_Name</a:t>
+            </a:r>
+            <a:endParaRPr lang="en-US" sz="1600" dirty="0"/>
+          </a:p>
+          <a:p>
+            <a:pPr algn="ctr"/>
+            <a:r>
+              <a:rPr lang="en-US" sz="1600" dirty="0" err="1"/>
+              <a:t>Cal_Entry_Description</a:t>
+            </a:r>
+            <a:endParaRPr lang="en-US" sz="1600" dirty="0"/>
+          </a:p>
+        </p:txBody>
+      </p:sp>
+      <p:sp>
+        <p:nvSpPr>
+          <p:cNvPr id="33" name="TextBox 32"/>
+          <p:cNvSpPr txBox="1"/>
+          <p:nvPr/>
+        </p:nvSpPr>
+        <p:spPr>
+          <a:xfrm>
+            <a:off x="8082119" y="2785578"/>
+            <a:ext cx="2615381" cy="1107996"/>
+          </a:xfrm>
+          <a:prstGeom prst="rect">
+            <a:avLst/>
+          </a:prstGeom>
+        </p:spPr>
+        <p:style>
+          <a:lnRef idx="1">
+            <a:schemeClr val="accent6"/>
+          </a:lnRef>
+          <a:fillRef idx="2">
+            <a:schemeClr val="accent6"/>
+          </a:fillRef>
+          <a:effectRef idx="1">
+            <a:schemeClr val="accent6"/>
+          </a:effectRef>
+          <a:fontRef idx="minor">
+            <a:schemeClr val="dk1"/>
+          </a:fontRef>
+        </p:style>
+        <p:txBody>
+          <a:bodyPr wrap="square" rtlCol="0">
+            <a:spAutoFit/>
+          </a:bodyPr>
+          <a:lstStyle/>
+          <a:p>
+            <a:pPr algn="ctr"/>
+            <a:r>
+              <a:rPr lang="en-US" b="1" u="sng" dirty="0" err="1"/>
+              <a:t>Event_Members</a:t>
+            </a:r>
+            <a:endParaRPr lang="en-US" b="1" u="sng" dirty="0"/>
+          </a:p>
+          <a:p>
+            <a:pPr algn="ctr"/>
+            <a:r>
+              <a:rPr lang="en-US" sz="1600" dirty="0" err="1"/>
+              <a:t>User_ID</a:t>
+            </a:r>
+            <a:r>
+              <a:rPr lang="en-US" sz="1600" dirty="0"/>
+              <a:t> (Foreign Key)</a:t>
+            </a:r>
+          </a:p>
+          <a:p>
+            <a:pPr algn="ctr"/>
+            <a:r>
+              <a:rPr lang="en-US" sz="1600" dirty="0" err="1" smtClean="0"/>
+              <a:t>Cal_Event_ID</a:t>
+            </a:r>
+            <a:r>
+              <a:rPr lang="en-US" sz="1600" dirty="0" smtClean="0"/>
+              <a:t> </a:t>
+            </a:r>
+            <a:r>
+              <a:rPr lang="en-US" sz="1600" dirty="0"/>
+              <a:t>(Foreign Key)</a:t>
+            </a:r>
+          </a:p>
+          <a:p>
+            <a:pPr algn="ctr"/>
+            <a:r>
+              <a:rPr lang="en-US" sz="1600" dirty="0" err="1" smtClean="0"/>
+              <a:t>Permission_Level</a:t>
+            </a:r>
+            <a:endParaRPr lang="en-US" sz="1600" dirty="0"/>
+          </a:p>
+        </p:txBody>
+      </p:sp>
+      <p:cxnSp>
+        <p:nvCxnSpPr>
+          <p:cNvPr id="39" name="Straight Connector 38"/>
+          <p:cNvCxnSpPr/>
+          <p:nvPr/>
+        </p:nvCxnSpPr>
+        <p:spPr>
+          <a:xfrm>
+            <a:off x="1179872" y="1913679"/>
+            <a:ext cx="589935" cy="0"/>
+          </a:xfrm>
+          <a:prstGeom prst="line">
+            <a:avLst/>
+          </a:prstGeom>
+        </p:spPr>
+        <p:style>
+          <a:lnRef idx="3">
+            <a:schemeClr val="dk1"/>
+          </a:lnRef>
+          <a:fillRef idx="0">
+            <a:schemeClr val="dk1"/>
+          </a:fillRef>
+          <a:effectRef idx="2">
+            <a:schemeClr val="dk1"/>
+          </a:effectRef>
+          <a:fontRef idx="minor">
+            <a:schemeClr val="tx1"/>
+          </a:fontRef>
+        </p:style>
+      </p:cxnSp>
+      <p:cxnSp>
+        <p:nvCxnSpPr>
+          <p:cNvPr id="40" name="Straight Connector 39"/>
+          <p:cNvCxnSpPr/>
+          <p:nvPr/>
+        </p:nvCxnSpPr>
+        <p:spPr>
+          <a:xfrm>
+            <a:off x="1179872" y="1913679"/>
+            <a:ext cx="0" cy="2451844"/>
+          </a:xfrm>
+          <a:prstGeom prst="line">
+            <a:avLst/>
+          </a:prstGeom>
+        </p:spPr>
+        <p:style>
+          <a:lnRef idx="3">
+            <a:schemeClr val="dk1"/>
+          </a:lnRef>
+          <a:fillRef idx="0">
+            <a:schemeClr val="dk1"/>
+          </a:fillRef>
+          <a:effectRef idx="2">
+            <a:schemeClr val="dk1"/>
+          </a:effectRef>
+          <a:fontRef idx="minor">
+            <a:schemeClr val="tx1"/>
+          </a:fontRef>
+        </p:style>
+      </p:cxnSp>
+      <p:cxnSp>
+        <p:nvCxnSpPr>
+          <p:cNvPr id="41" name="Straight Arrow Connector 40"/>
+          <p:cNvCxnSpPr/>
+          <p:nvPr/>
+        </p:nvCxnSpPr>
+        <p:spPr>
+          <a:xfrm>
+            <a:off x="1179872" y="4365523"/>
+            <a:ext cx="589935" cy="0"/>
+          </a:xfrm>
+          <a:prstGeom prst="straightConnector1">
+            <a:avLst/>
+          </a:prstGeom>
+          <a:ln>
+            <a:tailEnd type="triangle"/>
+          </a:ln>
+        </p:spPr>
+        <p:style>
+          <a:lnRef idx="3">
+            <a:schemeClr val="dk1"/>
+          </a:lnRef>
+          <a:fillRef idx="0">
+            <a:schemeClr val="dk1"/>
+          </a:fillRef>
+          <a:effectRef idx="2">
+            <a:schemeClr val="dk1"/>
+          </a:effectRef>
+          <a:fontRef idx="minor">
+            <a:schemeClr val="tx1"/>
+          </a:fontRef>
+        </p:style>
+      </p:cxnSp>
+      <p:cxnSp>
+        <p:nvCxnSpPr>
+          <p:cNvPr id="46" name="Straight Connector 45"/>
+          <p:cNvCxnSpPr/>
+          <p:nvPr/>
+        </p:nvCxnSpPr>
+        <p:spPr>
+          <a:xfrm>
+            <a:off x="3618271" y="1914984"/>
+            <a:ext cx="589935" cy="0"/>
+          </a:xfrm>
+          <a:prstGeom prst="line">
+            <a:avLst/>
+          </a:prstGeom>
+        </p:spPr>
+        <p:style>
+          <a:lnRef idx="3">
+            <a:schemeClr val="dk1"/>
+          </a:lnRef>
+          <a:fillRef idx="0">
+            <a:schemeClr val="dk1"/>
+          </a:fillRef>
+          <a:effectRef idx="2">
+            <a:schemeClr val="dk1"/>
+          </a:effectRef>
+          <a:fontRef idx="minor">
+            <a:schemeClr val="tx1"/>
+          </a:fontRef>
+        </p:style>
+      </p:cxnSp>
+      <p:cxnSp>
+        <p:nvCxnSpPr>
+          <p:cNvPr id="47" name="Straight Connector 46"/>
+          <p:cNvCxnSpPr/>
+          <p:nvPr/>
+        </p:nvCxnSpPr>
+        <p:spPr>
+          <a:xfrm>
+            <a:off x="4208206" y="1002890"/>
+            <a:ext cx="0" cy="913915"/>
+          </a:xfrm>
+          <a:prstGeom prst="line">
+            <a:avLst/>
+          </a:prstGeom>
+        </p:spPr>
+        <p:style>
+          <a:lnRef idx="3">
+            <a:schemeClr val="dk1"/>
+          </a:lnRef>
+          <a:fillRef idx="0">
+            <a:schemeClr val="dk1"/>
+          </a:fillRef>
+          <a:effectRef idx="2">
+            <a:schemeClr val="dk1"/>
+          </a:effectRef>
+          <a:fontRef idx="minor">
+            <a:schemeClr val="tx1"/>
+          </a:fontRef>
+        </p:style>
+      </p:cxnSp>
+      <p:cxnSp>
+        <p:nvCxnSpPr>
+          <p:cNvPr id="9" name="Straight Arrow Connector 8"/>
+          <p:cNvCxnSpPr/>
+          <p:nvPr/>
+        </p:nvCxnSpPr>
+        <p:spPr>
+          <a:xfrm>
+            <a:off x="4264740" y="3893574"/>
+            <a:ext cx="452283" cy="0"/>
+          </a:xfrm>
+          <a:prstGeom prst="straightConnector1">
+            <a:avLst/>
+          </a:prstGeom>
+          <a:ln>
+            <a:tailEnd type="triangle"/>
+          </a:ln>
+        </p:spPr>
+        <p:style>
+          <a:lnRef idx="3">
+            <a:schemeClr val="dk1"/>
+          </a:lnRef>
+          <a:fillRef idx="0">
+            <a:schemeClr val="dk1"/>
+          </a:fillRef>
+          <a:effectRef idx="2">
+            <a:schemeClr val="dk1"/>
+          </a:effectRef>
+          <a:fontRef idx="minor">
+            <a:schemeClr val="tx1"/>
+          </a:fontRef>
+        </p:style>
+      </p:cxnSp>
+      <p:cxnSp>
+        <p:nvCxnSpPr>
+          <p:cNvPr id="59" name="Straight Connector 58"/>
+          <p:cNvCxnSpPr/>
+          <p:nvPr/>
+        </p:nvCxnSpPr>
+        <p:spPr>
+          <a:xfrm>
+            <a:off x="4245075" y="2534056"/>
+            <a:ext cx="589935" cy="0"/>
+          </a:xfrm>
+          <a:prstGeom prst="line">
+            <a:avLst/>
+          </a:prstGeom>
+        </p:spPr>
+        <p:style>
+          <a:lnRef idx="3">
+            <a:schemeClr val="dk1"/>
+          </a:lnRef>
+          <a:fillRef idx="0">
+            <a:schemeClr val="dk1"/>
+          </a:fillRef>
+          <a:effectRef idx="2">
+            <a:schemeClr val="dk1"/>
+          </a:effectRef>
+          <a:fontRef idx="minor">
+            <a:schemeClr val="tx1"/>
+          </a:fontRef>
+        </p:style>
+      </p:cxnSp>
+      <p:cxnSp>
+        <p:nvCxnSpPr>
+          <p:cNvPr id="61" name="Straight Arrow Connector 60"/>
+          <p:cNvCxnSpPr/>
+          <p:nvPr/>
+        </p:nvCxnSpPr>
+        <p:spPr>
+          <a:xfrm flipH="1">
+            <a:off x="6902244" y="762000"/>
+            <a:ext cx="1494504" cy="0"/>
+          </a:xfrm>
+          <a:prstGeom prst="straightConnector1">
+            <a:avLst/>
+          </a:prstGeom>
+          <a:ln>
+            <a:tailEnd type="triangle"/>
+          </a:ln>
+        </p:spPr>
+        <p:style>
+          <a:lnRef idx="3">
+            <a:schemeClr val="dk1"/>
+          </a:lnRef>
+          <a:fillRef idx="0">
+            <a:schemeClr val="dk1"/>
+          </a:fillRef>
+          <a:effectRef idx="2">
+            <a:schemeClr val="dk1"/>
+          </a:effectRef>
+          <a:fontRef idx="minor">
+            <a:schemeClr val="tx1"/>
+          </a:fontRef>
+        </p:style>
+      </p:cxnSp>
+      <p:cxnSp>
+        <p:nvCxnSpPr>
+          <p:cNvPr id="63" name="Straight Connector 62"/>
+          <p:cNvCxnSpPr/>
+          <p:nvPr/>
+        </p:nvCxnSpPr>
+        <p:spPr>
+          <a:xfrm>
+            <a:off x="10432028" y="757084"/>
+            <a:ext cx="589935" cy="0"/>
+          </a:xfrm>
+          <a:prstGeom prst="line">
+            <a:avLst/>
+          </a:prstGeom>
+        </p:spPr>
+        <p:style>
+          <a:lnRef idx="3">
+            <a:schemeClr val="dk1"/>
+          </a:lnRef>
+          <a:fillRef idx="0">
+            <a:schemeClr val="dk1"/>
+          </a:fillRef>
+          <a:effectRef idx="2">
+            <a:schemeClr val="dk1"/>
+          </a:effectRef>
+          <a:fontRef idx="minor">
+            <a:schemeClr val="tx1"/>
+          </a:fontRef>
+        </p:style>
+      </p:cxnSp>
+      <p:cxnSp>
+        <p:nvCxnSpPr>
+          <p:cNvPr id="64" name="Straight Connector 63"/>
+          <p:cNvCxnSpPr/>
+          <p:nvPr/>
+        </p:nvCxnSpPr>
+        <p:spPr>
+          <a:xfrm>
+            <a:off x="11021963" y="753974"/>
+            <a:ext cx="0" cy="2469139"/>
+          </a:xfrm>
+          <a:prstGeom prst="line">
+            <a:avLst/>
+          </a:prstGeom>
+        </p:spPr>
+        <p:style>
+          <a:lnRef idx="3">
+            <a:schemeClr val="dk1"/>
+          </a:lnRef>
+          <a:fillRef idx="0">
+            <a:schemeClr val="dk1"/>
+          </a:fillRef>
+          <a:effectRef idx="2">
+            <a:schemeClr val="dk1"/>
+          </a:effectRef>
+          <a:fontRef idx="minor">
+            <a:schemeClr val="tx1"/>
+          </a:fontRef>
+        </p:style>
+      </p:cxnSp>
+      <p:cxnSp>
+        <p:nvCxnSpPr>
+          <p:cNvPr id="65" name="Straight Arrow Connector 64"/>
+          <p:cNvCxnSpPr/>
+          <p:nvPr/>
+        </p:nvCxnSpPr>
+        <p:spPr>
+          <a:xfrm flipH="1">
+            <a:off x="10432028" y="3223113"/>
+            <a:ext cx="589935" cy="0"/>
+          </a:xfrm>
+          <a:prstGeom prst="straightConnector1">
+            <a:avLst/>
+          </a:prstGeom>
+          <a:ln>
+            <a:tailEnd type="triangle"/>
+          </a:ln>
+        </p:spPr>
+        <p:style>
+          <a:lnRef idx="3">
+            <a:schemeClr val="dk1"/>
+          </a:lnRef>
+          <a:fillRef idx="0">
+            <a:schemeClr val="dk1"/>
+          </a:fillRef>
+          <a:effectRef idx="2">
+            <a:schemeClr val="dk1"/>
+          </a:effectRef>
+          <a:fontRef idx="minor">
+            <a:schemeClr val="tx1"/>
+          </a:fontRef>
+        </p:style>
+      </p:cxnSp>
+      <p:cxnSp>
+        <p:nvCxnSpPr>
+          <p:cNvPr id="72" name="Elbow Connector 71"/>
+          <p:cNvCxnSpPr/>
+          <p:nvPr/>
+        </p:nvCxnSpPr>
+        <p:spPr>
+          <a:xfrm flipV="1">
+            <a:off x="6902244" y="3480619"/>
+            <a:ext cx="1317524" cy="176981"/>
+          </a:xfrm>
+          <a:prstGeom prst="bentConnector3">
+            <a:avLst/>
+          </a:prstGeom>
+          <a:ln>
+            <a:tailEnd type="triangle"/>
+          </a:ln>
+        </p:spPr>
+        <p:style>
+          <a:lnRef idx="3">
+            <a:schemeClr val="dk1"/>
+          </a:lnRef>
+          <a:fillRef idx="0">
+            <a:schemeClr val="dk1"/>
+          </a:fillRef>
+          <a:effectRef idx="2">
+            <a:schemeClr val="dk1"/>
+          </a:effectRef>
+          <a:fontRef idx="minor">
+            <a:schemeClr val="tx1"/>
+          </a:fontRef>
+        </p:style>
+      </p:cxnSp>
+    </p:spTree>
+    <p:extLst>
+      <p:ext uri="{BB962C8B-B14F-4D97-AF65-F5344CB8AC3E}">
+        <p14:creationId xmlns:p14="http://schemas.microsoft.com/office/powerpoint/2010/main" val="2064661959"/>
       </p:ext>
     </p:extLst>
   </p:cSld>

</xml_diff>